<commit_message>
Added some notes to the presentation
</commit_message>
<xml_diff>
--- a/slides.pptx
+++ b/slides.pptx
@@ -4,6 +4,9 @@
   <p:sldMasterIdLst>
     <p:sldMasterId id="2147483714" r:id="rId1"/>
   </p:sldMasterIdLst>
+  <p:notesMasterIdLst>
+    <p:notesMasterId r:id="rId8"/>
+  </p:notesMasterIdLst>
   <p:sldIdLst>
     <p:sldId id="256" r:id="rId2"/>
     <p:sldId id="257" r:id="rId3"/>
@@ -117,6 +120,631 @@
 </p:presentation>
 </file>
 
+<file path=ppt/notesMasters/notesMaster1.xml><?xml version="1.0" encoding="utf-8"?>
+<p:notesMaster xmlns:a="http://schemas.openxmlformats.org/drawingml/2006/main" xmlns:r="http://schemas.openxmlformats.org/officeDocument/2006/relationships" xmlns:p="http://schemas.openxmlformats.org/presentationml/2006/main">
+  <p:cSld>
+    <p:bg>
+      <p:bgRef idx="1001">
+        <a:schemeClr val="bg1"/>
+      </p:bgRef>
+    </p:bg>
+    <p:spTree>
+      <p:nvGrpSpPr>
+        <p:cNvPr id="1" name=""/>
+        <p:cNvGrpSpPr/>
+        <p:nvPr/>
+      </p:nvGrpSpPr>
+      <p:grpSpPr>
+        <a:xfrm>
+          <a:off x="0" y="0"/>
+          <a:ext cx="0" cy="0"/>
+          <a:chOff x="0" y="0"/>
+          <a:chExt cx="0" cy="0"/>
+        </a:xfrm>
+      </p:grpSpPr>
+      <p:sp>
+        <p:nvSpPr>
+          <p:cNvPr id="2" name="Header Placeholder 1"/>
+          <p:cNvSpPr>
+            <a:spLocks noGrp="1"/>
+          </p:cNvSpPr>
+          <p:nvPr>
+            <p:ph type="hdr" sz="quarter"/>
+          </p:nvPr>
+        </p:nvSpPr>
+        <p:spPr>
+          <a:xfrm>
+            <a:off x="0" y="0"/>
+            <a:ext cx="2971800" cy="458788"/>
+          </a:xfrm>
+          <a:prstGeom prst="rect">
+            <a:avLst/>
+          </a:prstGeom>
+        </p:spPr>
+        <p:txBody>
+          <a:bodyPr vert="horz" lIns="91440" tIns="45720" rIns="91440" bIns="45720" rtlCol="0"/>
+          <a:lstStyle>
+            <a:lvl1pPr algn="l">
+              <a:defRPr sz="1200"/>
+            </a:lvl1pPr>
+          </a:lstStyle>
+          <a:p>
+            <a:endParaRPr lang="en-US"/>
+          </a:p>
+        </p:txBody>
+      </p:sp>
+      <p:sp>
+        <p:nvSpPr>
+          <p:cNvPr id="3" name="Date Placeholder 2"/>
+          <p:cNvSpPr>
+            <a:spLocks noGrp="1"/>
+          </p:cNvSpPr>
+          <p:nvPr>
+            <p:ph type="dt" idx="1"/>
+          </p:nvPr>
+        </p:nvSpPr>
+        <p:spPr>
+          <a:xfrm>
+            <a:off x="3884613" y="0"/>
+            <a:ext cx="2971800" cy="458788"/>
+          </a:xfrm>
+          <a:prstGeom prst="rect">
+            <a:avLst/>
+          </a:prstGeom>
+        </p:spPr>
+        <p:txBody>
+          <a:bodyPr vert="horz" lIns="91440" tIns="45720" rIns="91440" bIns="45720" rtlCol="0"/>
+          <a:lstStyle>
+            <a:lvl1pPr algn="r">
+              <a:defRPr sz="1200"/>
+            </a:lvl1pPr>
+          </a:lstStyle>
+          <a:p>
+            <a:fld id="{C5A2CB09-0A72-4432-B929-6C634C5FBBF3}" type="datetimeFigureOut">
+              <a:rPr lang="en-US" smtClean="0"/>
+              <a:t>10/30/2018</a:t>
+            </a:fld>
+            <a:endParaRPr lang="en-US"/>
+          </a:p>
+        </p:txBody>
+      </p:sp>
+      <p:sp>
+        <p:nvSpPr>
+          <p:cNvPr id="4" name="Slide Image Placeholder 3"/>
+          <p:cNvSpPr>
+            <a:spLocks noGrp="1" noRot="1" noChangeAspect="1"/>
+          </p:cNvSpPr>
+          <p:nvPr>
+            <p:ph type="sldImg" idx="2"/>
+          </p:nvPr>
+        </p:nvSpPr>
+        <p:spPr>
+          <a:xfrm>
+            <a:off x="685800" y="1143000"/>
+            <a:ext cx="5486400" cy="3086100"/>
+          </a:xfrm>
+          <a:prstGeom prst="rect">
+            <a:avLst/>
+          </a:prstGeom>
+          <a:noFill/>
+          <a:ln w="12700">
+            <a:solidFill>
+              <a:prstClr val="black"/>
+            </a:solidFill>
+          </a:ln>
+        </p:spPr>
+        <p:txBody>
+          <a:bodyPr vert="horz" lIns="91440" tIns="45720" rIns="91440" bIns="45720" rtlCol="0" anchor="ctr"/>
+          <a:lstStyle/>
+          <a:p>
+            <a:endParaRPr lang="en-US"/>
+          </a:p>
+        </p:txBody>
+      </p:sp>
+      <p:sp>
+        <p:nvSpPr>
+          <p:cNvPr id="5" name="Notes Placeholder 4"/>
+          <p:cNvSpPr>
+            <a:spLocks noGrp="1"/>
+          </p:cNvSpPr>
+          <p:nvPr>
+            <p:ph type="body" sz="quarter" idx="3"/>
+          </p:nvPr>
+        </p:nvSpPr>
+        <p:spPr>
+          <a:xfrm>
+            <a:off x="685800" y="4400550"/>
+            <a:ext cx="5486400" cy="3600450"/>
+          </a:xfrm>
+          <a:prstGeom prst="rect">
+            <a:avLst/>
+          </a:prstGeom>
+        </p:spPr>
+        <p:txBody>
+          <a:bodyPr vert="horz" lIns="91440" tIns="45720" rIns="91440" bIns="45720" rtlCol="0"/>
+          <a:lstStyle/>
+          <a:p>
+            <a:pPr lvl="0"/>
+            <a:r>
+              <a:rPr lang="en-US"/>
+              <a:t>Edit Master text styles</a:t>
+            </a:r>
+          </a:p>
+          <a:p>
+            <a:pPr lvl="1"/>
+            <a:r>
+              <a:rPr lang="en-US"/>
+              <a:t>Second level</a:t>
+            </a:r>
+          </a:p>
+          <a:p>
+            <a:pPr lvl="2"/>
+            <a:r>
+              <a:rPr lang="en-US"/>
+              <a:t>Third level</a:t>
+            </a:r>
+          </a:p>
+          <a:p>
+            <a:pPr lvl="3"/>
+            <a:r>
+              <a:rPr lang="en-US"/>
+              <a:t>Fourth level</a:t>
+            </a:r>
+          </a:p>
+          <a:p>
+            <a:pPr lvl="4"/>
+            <a:r>
+              <a:rPr lang="en-US"/>
+              <a:t>Fifth level</a:t>
+            </a:r>
+          </a:p>
+        </p:txBody>
+      </p:sp>
+      <p:sp>
+        <p:nvSpPr>
+          <p:cNvPr id="6" name="Footer Placeholder 5"/>
+          <p:cNvSpPr>
+            <a:spLocks noGrp="1"/>
+          </p:cNvSpPr>
+          <p:nvPr>
+            <p:ph type="ftr" sz="quarter" idx="4"/>
+          </p:nvPr>
+        </p:nvSpPr>
+        <p:spPr>
+          <a:xfrm>
+            <a:off x="0" y="8685213"/>
+            <a:ext cx="2971800" cy="458787"/>
+          </a:xfrm>
+          <a:prstGeom prst="rect">
+            <a:avLst/>
+          </a:prstGeom>
+        </p:spPr>
+        <p:txBody>
+          <a:bodyPr vert="horz" lIns="91440" tIns="45720" rIns="91440" bIns="45720" rtlCol="0" anchor="b"/>
+          <a:lstStyle>
+            <a:lvl1pPr algn="l">
+              <a:defRPr sz="1200"/>
+            </a:lvl1pPr>
+          </a:lstStyle>
+          <a:p>
+            <a:endParaRPr lang="en-US"/>
+          </a:p>
+        </p:txBody>
+      </p:sp>
+      <p:sp>
+        <p:nvSpPr>
+          <p:cNvPr id="7" name="Slide Number Placeholder 6"/>
+          <p:cNvSpPr>
+            <a:spLocks noGrp="1"/>
+          </p:cNvSpPr>
+          <p:nvPr>
+            <p:ph type="sldNum" sz="quarter" idx="5"/>
+          </p:nvPr>
+        </p:nvSpPr>
+        <p:spPr>
+          <a:xfrm>
+            <a:off x="3884613" y="8685213"/>
+            <a:ext cx="2971800" cy="458787"/>
+          </a:xfrm>
+          <a:prstGeom prst="rect">
+            <a:avLst/>
+          </a:prstGeom>
+        </p:spPr>
+        <p:txBody>
+          <a:bodyPr vert="horz" lIns="91440" tIns="45720" rIns="91440" bIns="45720" rtlCol="0" anchor="b"/>
+          <a:lstStyle>
+            <a:lvl1pPr algn="r">
+              <a:defRPr sz="1200"/>
+            </a:lvl1pPr>
+          </a:lstStyle>
+          <a:p>
+            <a:fld id="{9576A8BB-3D8E-4C88-AF29-9AF27954C3F0}" type="slidenum">
+              <a:rPr lang="en-US" smtClean="0"/>
+              <a:t>‹#›</a:t>
+            </a:fld>
+            <a:endParaRPr lang="en-US"/>
+          </a:p>
+        </p:txBody>
+      </p:sp>
+    </p:spTree>
+    <p:extLst>
+      <p:ext uri="{BB962C8B-B14F-4D97-AF65-F5344CB8AC3E}">
+        <p14:creationId xmlns:p14="http://schemas.microsoft.com/office/powerpoint/2010/main" val="2528017127"/>
+      </p:ext>
+    </p:extLst>
+  </p:cSld>
+  <p:clrMap bg1="lt1" tx1="dk1" bg2="lt2" tx2="dk2" accent1="accent1" accent2="accent2" accent3="accent3" accent4="accent4" accent5="accent5" accent6="accent6" hlink="hlink" folHlink="folHlink"/>
+  <p:notesStyle>
+    <a:lvl1pPr marL="0" algn="l" defTabSz="914400" rtl="0" eaLnBrk="1" latinLnBrk="0" hangingPunct="1">
+      <a:defRPr sz="1200" kern="1200">
+        <a:solidFill>
+          <a:schemeClr val="tx1"/>
+        </a:solidFill>
+        <a:latin typeface="+mn-lt"/>
+        <a:ea typeface="+mn-ea"/>
+        <a:cs typeface="+mn-cs"/>
+      </a:defRPr>
+    </a:lvl1pPr>
+    <a:lvl2pPr marL="457200" algn="l" defTabSz="914400" rtl="0" eaLnBrk="1" latinLnBrk="0" hangingPunct="1">
+      <a:defRPr sz="1200" kern="1200">
+        <a:solidFill>
+          <a:schemeClr val="tx1"/>
+        </a:solidFill>
+        <a:latin typeface="+mn-lt"/>
+        <a:ea typeface="+mn-ea"/>
+        <a:cs typeface="+mn-cs"/>
+      </a:defRPr>
+    </a:lvl2pPr>
+    <a:lvl3pPr marL="914400" algn="l" defTabSz="914400" rtl="0" eaLnBrk="1" latinLnBrk="0" hangingPunct="1">
+      <a:defRPr sz="1200" kern="1200">
+        <a:solidFill>
+          <a:schemeClr val="tx1"/>
+        </a:solidFill>
+        <a:latin typeface="+mn-lt"/>
+        <a:ea typeface="+mn-ea"/>
+        <a:cs typeface="+mn-cs"/>
+      </a:defRPr>
+    </a:lvl3pPr>
+    <a:lvl4pPr marL="1371600" algn="l" defTabSz="914400" rtl="0" eaLnBrk="1" latinLnBrk="0" hangingPunct="1">
+      <a:defRPr sz="1200" kern="1200">
+        <a:solidFill>
+          <a:schemeClr val="tx1"/>
+        </a:solidFill>
+        <a:latin typeface="+mn-lt"/>
+        <a:ea typeface="+mn-ea"/>
+        <a:cs typeface="+mn-cs"/>
+      </a:defRPr>
+    </a:lvl4pPr>
+    <a:lvl5pPr marL="1828800" algn="l" defTabSz="914400" rtl="0" eaLnBrk="1" latinLnBrk="0" hangingPunct="1">
+      <a:defRPr sz="1200" kern="1200">
+        <a:solidFill>
+          <a:schemeClr val="tx1"/>
+        </a:solidFill>
+        <a:latin typeface="+mn-lt"/>
+        <a:ea typeface="+mn-ea"/>
+        <a:cs typeface="+mn-cs"/>
+      </a:defRPr>
+    </a:lvl5pPr>
+    <a:lvl6pPr marL="2286000" algn="l" defTabSz="914400" rtl="0" eaLnBrk="1" latinLnBrk="0" hangingPunct="1">
+      <a:defRPr sz="1200" kern="1200">
+        <a:solidFill>
+          <a:schemeClr val="tx1"/>
+        </a:solidFill>
+        <a:latin typeface="+mn-lt"/>
+        <a:ea typeface="+mn-ea"/>
+        <a:cs typeface="+mn-cs"/>
+      </a:defRPr>
+    </a:lvl6pPr>
+    <a:lvl7pPr marL="2743200" algn="l" defTabSz="914400" rtl="0" eaLnBrk="1" latinLnBrk="0" hangingPunct="1">
+      <a:defRPr sz="1200" kern="1200">
+        <a:solidFill>
+          <a:schemeClr val="tx1"/>
+        </a:solidFill>
+        <a:latin typeface="+mn-lt"/>
+        <a:ea typeface="+mn-ea"/>
+        <a:cs typeface="+mn-cs"/>
+      </a:defRPr>
+    </a:lvl7pPr>
+    <a:lvl8pPr marL="3200400" algn="l" defTabSz="914400" rtl="0" eaLnBrk="1" latinLnBrk="0" hangingPunct="1">
+      <a:defRPr sz="1200" kern="1200">
+        <a:solidFill>
+          <a:schemeClr val="tx1"/>
+        </a:solidFill>
+        <a:latin typeface="+mn-lt"/>
+        <a:ea typeface="+mn-ea"/>
+        <a:cs typeface="+mn-cs"/>
+      </a:defRPr>
+    </a:lvl8pPr>
+    <a:lvl9pPr marL="3657600" algn="l" defTabSz="914400" rtl="0" eaLnBrk="1" latinLnBrk="0" hangingPunct="1">
+      <a:defRPr sz="1200" kern="1200">
+        <a:solidFill>
+          <a:schemeClr val="tx1"/>
+        </a:solidFill>
+        <a:latin typeface="+mn-lt"/>
+        <a:ea typeface="+mn-ea"/>
+        <a:cs typeface="+mn-cs"/>
+      </a:defRPr>
+    </a:lvl9pPr>
+  </p:notesStyle>
+</p:notesMaster>
+</file>
+
+<file path=ppt/notesSlides/notesSlide1.xml><?xml version="1.0" encoding="utf-8"?>
+<p:notes xmlns:a="http://schemas.openxmlformats.org/drawingml/2006/main" xmlns:r="http://schemas.openxmlformats.org/officeDocument/2006/relationships" xmlns:p="http://schemas.openxmlformats.org/presentationml/2006/main">
+  <p:cSld>
+    <p:spTree>
+      <p:nvGrpSpPr>
+        <p:cNvPr id="1" name=""/>
+        <p:cNvGrpSpPr/>
+        <p:nvPr/>
+      </p:nvGrpSpPr>
+      <p:grpSpPr>
+        <a:xfrm>
+          <a:off x="0" y="0"/>
+          <a:ext cx="0" cy="0"/>
+          <a:chOff x="0" y="0"/>
+          <a:chExt cx="0" cy="0"/>
+        </a:xfrm>
+      </p:grpSpPr>
+      <p:sp>
+        <p:nvSpPr>
+          <p:cNvPr id="2" name="Slide Image Placeholder 1"/>
+          <p:cNvSpPr>
+            <a:spLocks noGrp="1" noRot="1" noChangeAspect="1"/>
+          </p:cNvSpPr>
+          <p:nvPr>
+            <p:ph type="sldImg"/>
+          </p:nvPr>
+        </p:nvSpPr>
+        <p:spPr/>
+      </p:sp>
+      <p:sp>
+        <p:nvSpPr>
+          <p:cNvPr id="3" name="Notes Placeholder 2"/>
+          <p:cNvSpPr>
+            <a:spLocks noGrp="1"/>
+          </p:cNvSpPr>
+          <p:nvPr>
+            <p:ph type="body" idx="1"/>
+          </p:nvPr>
+        </p:nvSpPr>
+        <p:spPr/>
+        <p:txBody>
+          <a:bodyPr/>
+          <a:lstStyle/>
+          <a:p>
+            <a:r>
+              <a:rPr lang="en-US" dirty="0"/>
+              <a:t>Total seminar runtime: 1.5 </a:t>
+            </a:r>
+            <a:r>
+              <a:rPr lang="en-US" dirty="0" err="1"/>
+              <a:t>hr</a:t>
+            </a:r>
+            <a:r>
+              <a:rPr lang="en-US" dirty="0"/>
+              <a:t> </a:t>
+            </a:r>
+            <a:r>
+              <a:rPr lang="en-US"/>
+              <a:t>including questions</a:t>
+            </a:r>
+          </a:p>
+          <a:p>
+            <a:r>
+              <a:rPr lang="en-US" dirty="0"/>
+              <a:t>We’ll start out with a general introduction to the idea of functional programming</a:t>
+            </a:r>
+          </a:p>
+        </p:txBody>
+      </p:sp>
+      <p:sp>
+        <p:nvSpPr>
+          <p:cNvPr id="4" name="Slide Number Placeholder 3"/>
+          <p:cNvSpPr>
+            <a:spLocks noGrp="1"/>
+          </p:cNvSpPr>
+          <p:nvPr>
+            <p:ph type="sldNum" sz="quarter" idx="5"/>
+          </p:nvPr>
+        </p:nvSpPr>
+        <p:spPr/>
+        <p:txBody>
+          <a:bodyPr/>
+          <a:lstStyle/>
+          <a:p>
+            <a:fld id="{9576A8BB-3D8E-4C88-AF29-9AF27954C3F0}" type="slidenum">
+              <a:rPr lang="en-US" smtClean="0"/>
+              <a:t>1</a:t>
+            </a:fld>
+            <a:endParaRPr lang="en-US"/>
+          </a:p>
+        </p:txBody>
+      </p:sp>
+    </p:spTree>
+    <p:extLst>
+      <p:ext uri="{BB962C8B-B14F-4D97-AF65-F5344CB8AC3E}">
+        <p14:creationId xmlns:p14="http://schemas.microsoft.com/office/powerpoint/2010/main" val="120960637"/>
+      </p:ext>
+    </p:extLst>
+  </p:cSld>
+  <p:clrMapOvr>
+    <a:masterClrMapping/>
+  </p:clrMapOvr>
+</p:notes>
+</file>
+
+<file path=ppt/notesSlides/notesSlide2.xml><?xml version="1.0" encoding="utf-8"?>
+<p:notes xmlns:a="http://schemas.openxmlformats.org/drawingml/2006/main" xmlns:r="http://schemas.openxmlformats.org/officeDocument/2006/relationships" xmlns:p="http://schemas.openxmlformats.org/presentationml/2006/main">
+  <p:cSld>
+    <p:spTree>
+      <p:nvGrpSpPr>
+        <p:cNvPr id="1" name=""/>
+        <p:cNvGrpSpPr/>
+        <p:nvPr/>
+      </p:nvGrpSpPr>
+      <p:grpSpPr>
+        <a:xfrm>
+          <a:off x="0" y="0"/>
+          <a:ext cx="0" cy="0"/>
+          <a:chOff x="0" y="0"/>
+          <a:chExt cx="0" cy="0"/>
+        </a:xfrm>
+      </p:grpSpPr>
+      <p:sp>
+        <p:nvSpPr>
+          <p:cNvPr id="2" name="Slide Image Placeholder 1"/>
+          <p:cNvSpPr>
+            <a:spLocks noGrp="1" noRot="1" noChangeAspect="1"/>
+          </p:cNvSpPr>
+          <p:nvPr>
+            <p:ph type="sldImg"/>
+          </p:nvPr>
+        </p:nvSpPr>
+        <p:spPr/>
+      </p:sp>
+      <p:sp>
+        <p:nvSpPr>
+          <p:cNvPr id="3" name="Notes Placeholder 2"/>
+          <p:cNvSpPr>
+            <a:spLocks noGrp="1"/>
+          </p:cNvSpPr>
+          <p:nvPr>
+            <p:ph type="body" idx="1"/>
+          </p:nvPr>
+        </p:nvSpPr>
+        <p:spPr/>
+        <p:txBody>
+          <a:bodyPr/>
+          <a:lstStyle/>
+          <a:p>
+            <a:endParaRPr lang="en-US" dirty="0"/>
+          </a:p>
+        </p:txBody>
+      </p:sp>
+      <p:sp>
+        <p:nvSpPr>
+          <p:cNvPr id="4" name="Slide Number Placeholder 3"/>
+          <p:cNvSpPr>
+            <a:spLocks noGrp="1"/>
+          </p:cNvSpPr>
+          <p:nvPr>
+            <p:ph type="sldNum" sz="quarter" idx="5"/>
+          </p:nvPr>
+        </p:nvSpPr>
+        <p:spPr/>
+        <p:txBody>
+          <a:bodyPr/>
+          <a:lstStyle/>
+          <a:p>
+            <a:fld id="{9576A8BB-3D8E-4C88-AF29-9AF27954C3F0}" type="slidenum">
+              <a:rPr lang="en-US" smtClean="0"/>
+              <a:t>2</a:t>
+            </a:fld>
+            <a:endParaRPr lang="en-US"/>
+          </a:p>
+        </p:txBody>
+      </p:sp>
+    </p:spTree>
+    <p:extLst>
+      <p:ext uri="{BB962C8B-B14F-4D97-AF65-F5344CB8AC3E}">
+        <p14:creationId xmlns:p14="http://schemas.microsoft.com/office/powerpoint/2010/main" val="1625961607"/>
+      </p:ext>
+    </p:extLst>
+  </p:cSld>
+  <p:clrMapOvr>
+    <a:masterClrMapping/>
+  </p:clrMapOvr>
+</p:notes>
+</file>
+
+<file path=ppt/notesSlides/notesSlide3.xml><?xml version="1.0" encoding="utf-8"?>
+<p:notes xmlns:a="http://schemas.openxmlformats.org/drawingml/2006/main" xmlns:r="http://schemas.openxmlformats.org/officeDocument/2006/relationships" xmlns:p="http://schemas.openxmlformats.org/presentationml/2006/main">
+  <p:cSld>
+    <p:spTree>
+      <p:nvGrpSpPr>
+        <p:cNvPr id="1" name=""/>
+        <p:cNvGrpSpPr/>
+        <p:nvPr/>
+      </p:nvGrpSpPr>
+      <p:grpSpPr>
+        <a:xfrm>
+          <a:off x="0" y="0"/>
+          <a:ext cx="0" cy="0"/>
+          <a:chOff x="0" y="0"/>
+          <a:chExt cx="0" cy="0"/>
+        </a:xfrm>
+      </p:grpSpPr>
+      <p:sp>
+        <p:nvSpPr>
+          <p:cNvPr id="2" name="Slide Image Placeholder 1"/>
+          <p:cNvSpPr>
+            <a:spLocks noGrp="1" noRot="1" noChangeAspect="1"/>
+          </p:cNvSpPr>
+          <p:nvPr>
+            <p:ph type="sldImg"/>
+          </p:nvPr>
+        </p:nvSpPr>
+        <p:spPr/>
+      </p:sp>
+      <p:sp>
+        <p:nvSpPr>
+          <p:cNvPr id="3" name="Notes Placeholder 2"/>
+          <p:cNvSpPr>
+            <a:spLocks noGrp="1"/>
+          </p:cNvSpPr>
+          <p:nvPr>
+            <p:ph type="body" idx="1"/>
+          </p:nvPr>
+        </p:nvSpPr>
+        <p:spPr/>
+        <p:txBody>
+          <a:bodyPr/>
+          <a:lstStyle/>
+          <a:p>
+            <a:r>
+              <a:rPr lang="en-US" dirty="0"/>
+              <a:t>Pipelines – Everything is a pipeline</a:t>
+            </a:r>
+          </a:p>
+        </p:txBody>
+      </p:sp>
+      <p:sp>
+        <p:nvSpPr>
+          <p:cNvPr id="4" name="Slide Number Placeholder 3"/>
+          <p:cNvSpPr>
+            <a:spLocks noGrp="1"/>
+          </p:cNvSpPr>
+          <p:nvPr>
+            <p:ph type="sldNum" sz="quarter" idx="5"/>
+          </p:nvPr>
+        </p:nvSpPr>
+        <p:spPr/>
+        <p:txBody>
+          <a:bodyPr/>
+          <a:lstStyle/>
+          <a:p>
+            <a:fld id="{9576A8BB-3D8E-4C88-AF29-9AF27954C3F0}" type="slidenum">
+              <a:rPr lang="en-US" smtClean="0"/>
+              <a:t>3</a:t>
+            </a:fld>
+            <a:endParaRPr lang="en-US"/>
+          </a:p>
+        </p:txBody>
+      </p:sp>
+    </p:spTree>
+    <p:extLst>
+      <p:ext uri="{BB962C8B-B14F-4D97-AF65-F5344CB8AC3E}">
+        <p14:creationId xmlns:p14="http://schemas.microsoft.com/office/powerpoint/2010/main" val="3110541640"/>
+      </p:ext>
+    </p:extLst>
+  </p:cSld>
+  <p:clrMapOvr>
+    <a:masterClrMapping/>
+  </p:clrMapOvr>
+</p:notes>
+</file>
+
 <file path=ppt/slideLayouts/slideLayout1.xml><?xml version="1.0" encoding="utf-8"?>
 <p:sldLayout xmlns:a="http://schemas.openxmlformats.org/drawingml/2006/main" xmlns:r="http://schemas.openxmlformats.org/officeDocument/2006/relationships" xmlns:p="http://schemas.openxmlformats.org/presentationml/2006/main" type="title" preserve="1">
   <p:cSld name="Title Slide">
@@ -248,7 +876,7 @@
           <a:p>
             <a:fld id="{2FC8FDA8-9E37-49FC-A1C4-36151AA5C67F}" type="datetimeFigureOut">
               <a:rPr lang="en-US" smtClean="0"/>
-              <a:t>10/23/2018</a:t>
+              <a:t>10/30/2018</a:t>
             </a:fld>
             <a:endParaRPr lang="en-US"/>
           </a:p>
@@ -423,7 +1051,7 @@
           <a:p>
             <a:fld id="{2FC8FDA8-9E37-49FC-A1C4-36151AA5C67F}" type="datetimeFigureOut">
               <a:rPr lang="en-US" smtClean="0"/>
-              <a:t>10/23/2018</a:t>
+              <a:t>10/30/2018</a:t>
             </a:fld>
             <a:endParaRPr lang="en-US"/>
           </a:p>
@@ -603,7 +1231,7 @@
           <a:p>
             <a:fld id="{2FC8FDA8-9E37-49FC-A1C4-36151AA5C67F}" type="datetimeFigureOut">
               <a:rPr lang="en-US" smtClean="0"/>
-              <a:t>10/23/2018</a:t>
+              <a:t>10/30/2018</a:t>
             </a:fld>
             <a:endParaRPr lang="en-US"/>
           </a:p>
@@ -778,7 +1406,7 @@
           <a:p>
             <a:fld id="{2FC8FDA8-9E37-49FC-A1C4-36151AA5C67F}" type="datetimeFigureOut">
               <a:rPr lang="en-US" smtClean="0"/>
-              <a:t>10/23/2018</a:t>
+              <a:t>10/30/2018</a:t>
             </a:fld>
             <a:endParaRPr lang="en-US"/>
           </a:p>
@@ -1024,7 +1652,7 @@
           <a:p>
             <a:fld id="{2FC8FDA8-9E37-49FC-A1C4-36151AA5C67F}" type="datetimeFigureOut">
               <a:rPr lang="en-US" smtClean="0"/>
-              <a:t>10/23/2018</a:t>
+              <a:t>10/30/2018</a:t>
             </a:fld>
             <a:endParaRPr lang="en-US"/>
           </a:p>
@@ -1261,7 +1889,7 @@
           <a:p>
             <a:fld id="{2FC8FDA8-9E37-49FC-A1C4-36151AA5C67F}" type="datetimeFigureOut">
               <a:rPr lang="en-US" smtClean="0"/>
-              <a:t>10/23/2018</a:t>
+              <a:t>10/30/2018</a:t>
             </a:fld>
             <a:endParaRPr lang="en-US"/>
           </a:p>
@@ -1628,7 +2256,7 @@
           <a:p>
             <a:fld id="{2FC8FDA8-9E37-49FC-A1C4-36151AA5C67F}" type="datetimeFigureOut">
               <a:rPr lang="en-US" smtClean="0"/>
-              <a:t>10/23/2018</a:t>
+              <a:t>10/30/2018</a:t>
             </a:fld>
             <a:endParaRPr lang="en-US"/>
           </a:p>
@@ -1746,7 +2374,7 @@
           <a:p>
             <a:fld id="{2FC8FDA8-9E37-49FC-A1C4-36151AA5C67F}" type="datetimeFigureOut">
               <a:rPr lang="en-US" smtClean="0"/>
-              <a:t>10/23/2018</a:t>
+              <a:t>10/30/2018</a:t>
             </a:fld>
             <a:endParaRPr lang="en-US"/>
           </a:p>
@@ -1841,7 +2469,7 @@
           <a:p>
             <a:fld id="{2FC8FDA8-9E37-49FC-A1C4-36151AA5C67F}" type="datetimeFigureOut">
               <a:rPr lang="en-US" smtClean="0"/>
-              <a:t>10/23/2018</a:t>
+              <a:t>10/30/2018</a:t>
             </a:fld>
             <a:endParaRPr lang="en-US"/>
           </a:p>
@@ -2118,7 +2746,7 @@
           <a:p>
             <a:fld id="{2FC8FDA8-9E37-49FC-A1C4-36151AA5C67F}" type="datetimeFigureOut">
               <a:rPr lang="en-US" smtClean="0"/>
-              <a:t>10/23/2018</a:t>
+              <a:t>10/30/2018</a:t>
             </a:fld>
             <a:endParaRPr lang="en-US"/>
           </a:p>
@@ -2375,7 +3003,7 @@
           <a:p>
             <a:fld id="{2FC8FDA8-9E37-49FC-A1C4-36151AA5C67F}" type="datetimeFigureOut">
               <a:rPr lang="en-US" smtClean="0"/>
-              <a:t>10/23/2018</a:t>
+              <a:t>10/30/2018</a:t>
             </a:fld>
             <a:endParaRPr lang="en-US"/>
           </a:p>
@@ -2588,7 +3216,7 @@
           <a:p>
             <a:fld id="{2FC8FDA8-9E37-49FC-A1C4-36151AA5C67F}" type="datetimeFigureOut">
               <a:rPr lang="en-US" smtClean="0"/>
-              <a:t>10/23/2018</a:t>
+              <a:t>10/30/2018</a:t>
             </a:fld>
             <a:endParaRPr lang="en-US"/>
           </a:p>
@@ -4400,4 +5028,299 @@
     </a:ext>
   </a:extLst>
 </a:theme>
+</file>
+
+<file path=ppt/theme/theme2.xml><?xml version="1.0" encoding="utf-8"?>
+<a:theme xmlns:a="http://schemas.openxmlformats.org/drawingml/2006/main" name="Office Theme">
+  <a:themeElements>
+    <a:clrScheme name="Office">
+      <a:dk1>
+        <a:sysClr val="windowText" lastClr="000000"/>
+      </a:dk1>
+      <a:lt1>
+        <a:sysClr val="window" lastClr="FFFFFF"/>
+      </a:lt1>
+      <a:dk2>
+        <a:srgbClr val="44546A"/>
+      </a:dk2>
+      <a:lt2>
+        <a:srgbClr val="E7E6E6"/>
+      </a:lt2>
+      <a:accent1>
+        <a:srgbClr val="4472C4"/>
+      </a:accent1>
+      <a:accent2>
+        <a:srgbClr val="ED7D31"/>
+      </a:accent2>
+      <a:accent3>
+        <a:srgbClr val="A5A5A5"/>
+      </a:accent3>
+      <a:accent4>
+        <a:srgbClr val="FFC000"/>
+      </a:accent4>
+      <a:accent5>
+        <a:srgbClr val="5B9BD5"/>
+      </a:accent5>
+      <a:accent6>
+        <a:srgbClr val="70AD47"/>
+      </a:accent6>
+      <a:hlink>
+        <a:srgbClr val="0563C1"/>
+      </a:hlink>
+      <a:folHlink>
+        <a:srgbClr val="954F72"/>
+      </a:folHlink>
+    </a:clrScheme>
+    <a:fontScheme name="Office">
+      <a:majorFont>
+        <a:latin typeface="Calibri Light" panose="020F0302020204030204"/>
+        <a:ea typeface=""/>
+        <a:cs typeface=""/>
+        <a:font script="Jpan" typeface="游ゴシック Light"/>
+        <a:font script="Hang" typeface="맑은 고딕"/>
+        <a:font script="Hans" typeface="等线 Light"/>
+        <a:font script="Hant" typeface="新細明體"/>
+        <a:font script="Arab" typeface="Times New Roman"/>
+        <a:font script="Hebr" typeface="Times New Roman"/>
+        <a:font script="Thai" typeface="Angsana New"/>
+        <a:font script="Ethi" typeface="Nyala"/>
+        <a:font script="Beng" typeface="Vrinda"/>
+        <a:font script="Gujr" typeface="Shruti"/>
+        <a:font script="Khmr" typeface="MoolBoran"/>
+        <a:font script="Knda" typeface="Tunga"/>
+        <a:font script="Guru" typeface="Raavi"/>
+        <a:font script="Cans" typeface="Euphemia"/>
+        <a:font script="Cher" typeface="Plantagenet Cherokee"/>
+        <a:font script="Yiii" typeface="Microsoft Yi Baiti"/>
+        <a:font script="Tibt" typeface="Microsoft Himalaya"/>
+        <a:font script="Thaa" typeface="MV Boli"/>
+        <a:font script="Deva" typeface="Mangal"/>
+        <a:font script="Telu" typeface="Gautami"/>
+        <a:font script="Taml" typeface="Latha"/>
+        <a:font script="Syrc" typeface="Estrangelo Edessa"/>
+        <a:font script="Orya" typeface="Kalinga"/>
+        <a:font script="Mlym" typeface="Kartika"/>
+        <a:font script="Laoo" typeface="DokChampa"/>
+        <a:font script="Sinh" typeface="Iskoola Pota"/>
+        <a:font script="Mong" typeface="Mongolian Baiti"/>
+        <a:font script="Viet" typeface="Times New Roman"/>
+        <a:font script="Uigh" typeface="Microsoft Uighur"/>
+        <a:font script="Geor" typeface="Sylfaen"/>
+        <a:font script="Armn" typeface="Arial"/>
+        <a:font script="Bugi" typeface="Leelawadee UI"/>
+        <a:font script="Bopo" typeface="Microsoft JhengHei"/>
+        <a:font script="Java" typeface="Javanese Text"/>
+        <a:font script="Lisu" typeface="Segoe UI"/>
+        <a:font script="Mymr" typeface="Myanmar Text"/>
+        <a:font script="Nkoo" typeface="Ebrima"/>
+        <a:font script="Olck" typeface="Nirmala UI"/>
+        <a:font script="Osma" typeface="Ebrima"/>
+        <a:font script="Phag" typeface="Phagspa"/>
+        <a:font script="Syrn" typeface="Estrangelo Edessa"/>
+        <a:font script="Syrj" typeface="Estrangelo Edessa"/>
+        <a:font script="Syre" typeface="Estrangelo Edessa"/>
+        <a:font script="Sora" typeface="Nirmala UI"/>
+        <a:font script="Tale" typeface="Microsoft Tai Le"/>
+        <a:font script="Talu" typeface="Microsoft New Tai Lue"/>
+        <a:font script="Tfng" typeface="Ebrima"/>
+      </a:majorFont>
+      <a:minorFont>
+        <a:latin typeface="Calibri" panose="020F0502020204030204"/>
+        <a:ea typeface=""/>
+        <a:cs typeface=""/>
+        <a:font script="Jpan" typeface="游ゴシック"/>
+        <a:font script="Hang" typeface="맑은 고딕"/>
+        <a:font script="Hans" typeface="等线"/>
+        <a:font script="Hant" typeface="新細明體"/>
+        <a:font script="Arab" typeface="Arial"/>
+        <a:font script="Hebr" typeface="Arial"/>
+        <a:font script="Thai" typeface="Cordia New"/>
+        <a:font script="Ethi" typeface="Nyala"/>
+        <a:font script="Beng" typeface="Vrinda"/>
+        <a:font script="Gujr" typeface="Shruti"/>
+        <a:font script="Khmr" typeface="DaunPenh"/>
+        <a:font script="Knda" typeface="Tunga"/>
+        <a:font script="Guru" typeface="Raavi"/>
+        <a:font script="Cans" typeface="Euphemia"/>
+        <a:font script="Cher" typeface="Plantagenet Cherokee"/>
+        <a:font script="Yiii" typeface="Microsoft Yi Baiti"/>
+        <a:font script="Tibt" typeface="Microsoft Himalaya"/>
+        <a:font script="Thaa" typeface="MV Boli"/>
+        <a:font script="Deva" typeface="Mangal"/>
+        <a:font script="Telu" typeface="Gautami"/>
+        <a:font script="Taml" typeface="Latha"/>
+        <a:font script="Syrc" typeface="Estrangelo Edessa"/>
+        <a:font script="Orya" typeface="Kalinga"/>
+        <a:font script="Mlym" typeface="Kartika"/>
+        <a:font script="Laoo" typeface="DokChampa"/>
+        <a:font script="Sinh" typeface="Iskoola Pota"/>
+        <a:font script="Mong" typeface="Mongolian Baiti"/>
+        <a:font script="Viet" typeface="Arial"/>
+        <a:font script="Uigh" typeface="Microsoft Uighur"/>
+        <a:font script="Geor" typeface="Sylfaen"/>
+        <a:font script="Armn" typeface="Arial"/>
+        <a:font script="Bugi" typeface="Leelawadee UI"/>
+        <a:font script="Bopo" typeface="Microsoft JhengHei"/>
+        <a:font script="Java" typeface="Javanese Text"/>
+        <a:font script="Lisu" typeface="Segoe UI"/>
+        <a:font script="Mymr" typeface="Myanmar Text"/>
+        <a:font script="Nkoo" typeface="Ebrima"/>
+        <a:font script="Olck" typeface="Nirmala UI"/>
+        <a:font script="Osma" typeface="Ebrima"/>
+        <a:font script="Phag" typeface="Phagspa"/>
+        <a:font script="Syrn" typeface="Estrangelo Edessa"/>
+        <a:font script="Syrj" typeface="Estrangelo Edessa"/>
+        <a:font script="Syre" typeface="Estrangelo Edessa"/>
+        <a:font script="Sora" typeface="Nirmala UI"/>
+        <a:font script="Tale" typeface="Microsoft Tai Le"/>
+        <a:font script="Talu" typeface="Microsoft New Tai Lue"/>
+        <a:font script="Tfng" typeface="Ebrima"/>
+      </a:minorFont>
+    </a:fontScheme>
+    <a:fmtScheme name="Office">
+      <a:fillStyleLst>
+        <a:solidFill>
+          <a:schemeClr val="phClr"/>
+        </a:solidFill>
+        <a:gradFill rotWithShape="1">
+          <a:gsLst>
+            <a:gs pos="0">
+              <a:schemeClr val="phClr">
+                <a:lumMod val="110000"/>
+                <a:satMod val="105000"/>
+                <a:tint val="67000"/>
+              </a:schemeClr>
+            </a:gs>
+            <a:gs pos="50000">
+              <a:schemeClr val="phClr">
+                <a:lumMod val="105000"/>
+                <a:satMod val="103000"/>
+                <a:tint val="73000"/>
+              </a:schemeClr>
+            </a:gs>
+            <a:gs pos="100000">
+              <a:schemeClr val="phClr">
+                <a:lumMod val="105000"/>
+                <a:satMod val="109000"/>
+                <a:tint val="81000"/>
+              </a:schemeClr>
+            </a:gs>
+          </a:gsLst>
+          <a:lin ang="5400000" scaled="0"/>
+        </a:gradFill>
+        <a:gradFill rotWithShape="1">
+          <a:gsLst>
+            <a:gs pos="0">
+              <a:schemeClr val="phClr">
+                <a:satMod val="103000"/>
+                <a:lumMod val="102000"/>
+                <a:tint val="94000"/>
+              </a:schemeClr>
+            </a:gs>
+            <a:gs pos="50000">
+              <a:schemeClr val="phClr">
+                <a:satMod val="110000"/>
+                <a:lumMod val="100000"/>
+                <a:shade val="100000"/>
+              </a:schemeClr>
+            </a:gs>
+            <a:gs pos="100000">
+              <a:schemeClr val="phClr">
+                <a:lumMod val="99000"/>
+                <a:satMod val="120000"/>
+                <a:shade val="78000"/>
+              </a:schemeClr>
+            </a:gs>
+          </a:gsLst>
+          <a:lin ang="5400000" scaled="0"/>
+        </a:gradFill>
+      </a:fillStyleLst>
+      <a:lnStyleLst>
+        <a:ln w="6350" cap="flat" cmpd="sng" algn="ctr">
+          <a:solidFill>
+            <a:schemeClr val="phClr"/>
+          </a:solidFill>
+          <a:prstDash val="solid"/>
+          <a:miter lim="800000"/>
+        </a:ln>
+        <a:ln w="12700" cap="flat" cmpd="sng" algn="ctr">
+          <a:solidFill>
+            <a:schemeClr val="phClr"/>
+          </a:solidFill>
+          <a:prstDash val="solid"/>
+          <a:miter lim="800000"/>
+        </a:ln>
+        <a:ln w="19050" cap="flat" cmpd="sng" algn="ctr">
+          <a:solidFill>
+            <a:schemeClr val="phClr"/>
+          </a:solidFill>
+          <a:prstDash val="solid"/>
+          <a:miter lim="800000"/>
+        </a:ln>
+      </a:lnStyleLst>
+      <a:effectStyleLst>
+        <a:effectStyle>
+          <a:effectLst/>
+        </a:effectStyle>
+        <a:effectStyle>
+          <a:effectLst/>
+        </a:effectStyle>
+        <a:effectStyle>
+          <a:effectLst>
+            <a:outerShdw blurRad="57150" dist="19050" dir="5400000" algn="ctr" rotWithShape="0">
+              <a:srgbClr val="000000">
+                <a:alpha val="63000"/>
+              </a:srgbClr>
+            </a:outerShdw>
+          </a:effectLst>
+        </a:effectStyle>
+      </a:effectStyleLst>
+      <a:bgFillStyleLst>
+        <a:solidFill>
+          <a:schemeClr val="phClr"/>
+        </a:solidFill>
+        <a:solidFill>
+          <a:schemeClr val="phClr">
+            <a:tint val="95000"/>
+            <a:satMod val="170000"/>
+          </a:schemeClr>
+        </a:solidFill>
+        <a:gradFill rotWithShape="1">
+          <a:gsLst>
+            <a:gs pos="0">
+              <a:schemeClr val="phClr">
+                <a:tint val="93000"/>
+                <a:satMod val="150000"/>
+                <a:shade val="98000"/>
+                <a:lumMod val="102000"/>
+              </a:schemeClr>
+            </a:gs>
+            <a:gs pos="50000">
+              <a:schemeClr val="phClr">
+                <a:tint val="98000"/>
+                <a:satMod val="130000"/>
+                <a:shade val="90000"/>
+                <a:lumMod val="103000"/>
+              </a:schemeClr>
+            </a:gs>
+            <a:gs pos="100000">
+              <a:schemeClr val="phClr">
+                <a:shade val="63000"/>
+                <a:satMod val="120000"/>
+              </a:schemeClr>
+            </a:gs>
+          </a:gsLst>
+          <a:lin ang="5400000" scaled="0"/>
+        </a:gradFill>
+      </a:bgFillStyleLst>
+    </a:fmtScheme>
+  </a:themeElements>
+  <a:objectDefaults/>
+  <a:extraClrSchemeLst/>
+  <a:extLst>
+    <a:ext uri="{05A4C25C-085E-4340-85A3-A5531E510DB2}">
+      <thm15:themeFamily xmlns:thm15="http://schemas.microsoft.com/office/thememl/2012/main" name="Office Theme" id="{62F939B6-93AF-4DB8-9C6B-D6C7DFDC589F}" vid="{4A3C46E8-61CC-4603-A589-7422A47A8E4A}"/>
+    </a:ext>
+  </a:extLst>
+</a:theme>
 </file>
</xml_diff>